<commit_message>
Adding the power point
</commit_message>
<xml_diff>
--- a/BRFSS.pptx
+++ b/BRFSS.pptx
@@ -11211,8 +11211,8 @@
         </p:blipFill>
         <p:spPr>
           <a:xfrm>
-            <a:off x="642250" y="810988"/>
-            <a:ext cx="8051175" cy="3521524"/>
+            <a:off x="219125" y="233125"/>
+            <a:ext cx="8718574" cy="3939900"/>
           </a:xfrm>
           <a:prstGeom prst="rect">
             <a:avLst/>
@@ -11264,8 +11264,8 @@
         </p:blipFill>
         <p:spPr>
           <a:xfrm>
-            <a:off x="397350" y="708950"/>
-            <a:ext cx="8403901" cy="3618125"/>
+            <a:off x="207575" y="103800"/>
+            <a:ext cx="8718600" cy="3953975"/>
           </a:xfrm>
           <a:prstGeom prst="rect">
             <a:avLst/>
@@ -11317,8 +11317,8 @@
         </p:blipFill>
         <p:spPr>
           <a:xfrm>
-            <a:off x="152400" y="152400"/>
-            <a:ext cx="8839201" cy="4249775"/>
+            <a:off x="207575" y="152400"/>
+            <a:ext cx="8730125" cy="4197325"/>
           </a:xfrm>
           <a:prstGeom prst="rect">
             <a:avLst/>

</xml_diff>

<commit_message>
Adding the latest power point
</commit_message>
<xml_diff>
--- a/BRFSS.pptx
+++ b/BRFSS.pptx
@@ -923,7 +923,7 @@
   <p:cSld>
     <p:spTree>
       <p:nvGrpSpPr>
-        <p:cNvPr id="198" name="Shape 198"/>
+        <p:cNvPr id="199" name="Shape 199"/>
         <p:cNvGrpSpPr/>
         <p:nvPr/>
       </p:nvGrpSpPr>
@@ -937,7 +937,7 @@
       </p:grpSpPr>
       <p:sp>
         <p:nvSpPr>
-          <p:cNvPr id="199" name="Google Shape;199;g5ce966834a_4_101:notes"/>
+          <p:cNvPr id="200" name="Google Shape;200;g5ce966834a_4_101:notes"/>
           <p:cNvSpPr/>
           <p:nvPr>
             <p:ph idx="2" type="sldImg"/>
@@ -972,7 +972,7 @@
       </p:sp>
       <p:sp>
         <p:nvSpPr>
-          <p:cNvPr id="200" name="Google Shape;200;g5ce966834a_4_101:notes"/>
+          <p:cNvPr id="201" name="Google Shape;201;g5ce966834a_4_101:notes"/>
           <p:cNvSpPr txBox="1"/>
           <p:nvPr>
             <p:ph idx="1" type="body"/>
@@ -1023,7 +1023,7 @@
   <p:cSld>
     <p:spTree>
       <p:nvGrpSpPr>
-        <p:cNvPr id="203" name="Shape 203"/>
+        <p:cNvPr id="205" name="Shape 205"/>
         <p:cNvGrpSpPr/>
         <p:nvPr/>
       </p:nvGrpSpPr>
@@ -1037,7 +1037,7 @@
       </p:grpSpPr>
       <p:sp>
         <p:nvSpPr>
-          <p:cNvPr id="204" name="Google Shape;204;g5ce966834a_4_96:notes"/>
+          <p:cNvPr id="206" name="Google Shape;206;g5ce966834a_4_96:notes"/>
           <p:cNvSpPr/>
           <p:nvPr>
             <p:ph idx="2" type="sldImg"/>
@@ -1072,7 +1072,7 @@
       </p:sp>
       <p:sp>
         <p:nvSpPr>
-          <p:cNvPr id="205" name="Google Shape;205;g5ce966834a_4_96:notes"/>
+          <p:cNvPr id="207" name="Google Shape;207;g5ce966834a_4_96:notes"/>
           <p:cNvSpPr txBox="1"/>
           <p:nvPr>
             <p:ph idx="1" type="body"/>
@@ -1123,7 +1123,7 @@
   <p:cSld>
     <p:spTree>
       <p:nvGrpSpPr>
-        <p:cNvPr id="208" name="Shape 208"/>
+        <p:cNvPr id="211" name="Shape 211"/>
         <p:cNvGrpSpPr/>
         <p:nvPr/>
       </p:nvGrpSpPr>
@@ -1137,7 +1137,7 @@
       </p:grpSpPr>
       <p:sp>
         <p:nvSpPr>
-          <p:cNvPr id="209" name="Google Shape;209;g5ce966834a_4_118:notes"/>
+          <p:cNvPr id="212" name="Google Shape;212;g5ce966834a_4_118:notes"/>
           <p:cNvSpPr/>
           <p:nvPr>
             <p:ph idx="2" type="sldImg"/>
@@ -1172,7 +1172,7 @@
       </p:sp>
       <p:sp>
         <p:nvSpPr>
-          <p:cNvPr id="210" name="Google Shape;210;g5ce966834a_4_118:notes"/>
+          <p:cNvPr id="213" name="Google Shape;213;g5ce966834a_4_118:notes"/>
           <p:cNvSpPr txBox="1"/>
           <p:nvPr>
             <p:ph idx="1" type="body"/>
@@ -1223,7 +1223,7 @@
   <p:cSld>
     <p:spTree>
       <p:nvGrpSpPr>
-        <p:cNvPr id="215" name="Shape 215"/>
+        <p:cNvPr id="218" name="Shape 218"/>
         <p:cNvGrpSpPr/>
         <p:nvPr/>
       </p:nvGrpSpPr>
@@ -1237,7 +1237,7 @@
       </p:grpSpPr>
       <p:sp>
         <p:nvSpPr>
-          <p:cNvPr id="216" name="Google Shape;216;g5ce966834a_4_86:notes"/>
+          <p:cNvPr id="219" name="Google Shape;219;g5ce966834a_4_86:notes"/>
           <p:cNvSpPr/>
           <p:nvPr>
             <p:ph idx="2" type="sldImg"/>
@@ -1272,7 +1272,7 @@
       </p:sp>
       <p:sp>
         <p:nvSpPr>
-          <p:cNvPr id="217" name="Google Shape;217;g5ce966834a_4_86:notes"/>
+          <p:cNvPr id="220" name="Google Shape;220;g5ce966834a_4_86:notes"/>
           <p:cNvSpPr txBox="1"/>
           <p:nvPr>
             <p:ph idx="1" type="body"/>
@@ -1323,7 +1323,7 @@
   <p:cSld>
     <p:spTree>
       <p:nvGrpSpPr>
-        <p:cNvPr id="221" name="Shape 221"/>
+        <p:cNvPr id="224" name="Shape 224"/>
         <p:cNvGrpSpPr/>
         <p:nvPr/>
       </p:nvGrpSpPr>
@@ -1337,7 +1337,7 @@
       </p:grpSpPr>
       <p:sp>
         <p:nvSpPr>
-          <p:cNvPr id="222" name="Google Shape;222;g5ce966834a_4_0:notes"/>
+          <p:cNvPr id="225" name="Google Shape;225;g5ce966834a_4_0:notes"/>
           <p:cNvSpPr/>
           <p:nvPr>
             <p:ph idx="2" type="sldImg"/>
@@ -1372,7 +1372,7 @@
       </p:sp>
       <p:sp>
         <p:nvSpPr>
-          <p:cNvPr id="223" name="Google Shape;223;g5ce966834a_4_0:notes"/>
+          <p:cNvPr id="226" name="Google Shape;226;g5ce966834a_4_0:notes"/>
           <p:cNvSpPr txBox="1"/>
           <p:nvPr>
             <p:ph idx="1" type="body"/>
@@ -1423,7 +1423,7 @@
   <p:cSld>
     <p:spTree>
       <p:nvGrpSpPr>
-        <p:cNvPr id="228" name="Shape 228"/>
+        <p:cNvPr id="231" name="Shape 231"/>
         <p:cNvGrpSpPr/>
         <p:nvPr/>
       </p:nvGrpSpPr>
@@ -1437,7 +1437,7 @@
       </p:grpSpPr>
       <p:sp>
         <p:nvSpPr>
-          <p:cNvPr id="229" name="Google Shape;229;g5ce966834a_4_126:notes"/>
+          <p:cNvPr id="232" name="Google Shape;232;g5ce966834a_4_126:notes"/>
           <p:cNvSpPr/>
           <p:nvPr>
             <p:ph idx="2" type="sldImg"/>
@@ -1472,7 +1472,7 @@
       </p:sp>
       <p:sp>
         <p:nvSpPr>
-          <p:cNvPr id="230" name="Google Shape;230;g5ce966834a_4_126:notes"/>
+          <p:cNvPr id="233" name="Google Shape;233;g5ce966834a_4_126:notes"/>
           <p:cNvSpPr txBox="1"/>
           <p:nvPr>
             <p:ph idx="1" type="body"/>
@@ -1523,7 +1523,7 @@
   <p:cSld>
     <p:spTree>
       <p:nvGrpSpPr>
-        <p:cNvPr id="234" name="Shape 234"/>
+        <p:cNvPr id="237" name="Shape 237"/>
         <p:cNvGrpSpPr/>
         <p:nvPr/>
       </p:nvGrpSpPr>
@@ -1537,7 +1537,7 @@
       </p:grpSpPr>
       <p:sp>
         <p:nvSpPr>
-          <p:cNvPr id="235" name="Google Shape;235;g5ce966834a_4_36:notes"/>
+          <p:cNvPr id="238" name="Google Shape;238;g5ce966834a_4_36:notes"/>
           <p:cNvSpPr/>
           <p:nvPr>
             <p:ph idx="2" type="sldImg"/>
@@ -1572,7 +1572,7 @@
       </p:sp>
       <p:sp>
         <p:nvSpPr>
-          <p:cNvPr id="236" name="Google Shape;236;g5ce966834a_4_36:notes"/>
+          <p:cNvPr id="239" name="Google Shape;239;g5ce966834a_4_36:notes"/>
           <p:cNvSpPr txBox="1"/>
           <p:nvPr>
             <p:ph idx="1" type="body"/>
@@ -1622,7 +1622,7 @@
   <p:cSld>
     <p:spTree>
       <p:nvGrpSpPr>
-        <p:cNvPr id="242" name="Shape 242"/>
+        <p:cNvPr id="245" name="Shape 245"/>
         <p:cNvGrpSpPr/>
         <p:nvPr/>
       </p:nvGrpSpPr>
@@ -1636,7 +1636,7 @@
       </p:grpSpPr>
       <p:sp>
         <p:nvSpPr>
-          <p:cNvPr id="243" name="Google Shape;243;g5ce966834a_4_70:notes"/>
+          <p:cNvPr id="246" name="Google Shape;246;g5ce966834a_4_70:notes"/>
           <p:cNvSpPr/>
           <p:nvPr>
             <p:ph idx="2" type="sldImg"/>
@@ -1671,7 +1671,7 @@
       </p:sp>
       <p:sp>
         <p:nvSpPr>
-          <p:cNvPr id="244" name="Google Shape;244;g5ce966834a_4_70:notes"/>
+          <p:cNvPr id="247" name="Google Shape;247;g5ce966834a_4_70:notes"/>
           <p:cNvSpPr txBox="1"/>
           <p:nvPr>
             <p:ph idx="1" type="body"/>
@@ -1722,7 +1722,7 @@
   <p:cSld>
     <p:spTree>
       <p:nvGrpSpPr>
-        <p:cNvPr id="248" name="Shape 248"/>
+        <p:cNvPr id="251" name="Shape 251"/>
         <p:cNvGrpSpPr/>
         <p:nvPr/>
       </p:nvGrpSpPr>
@@ -1736,7 +1736,7 @@
       </p:grpSpPr>
       <p:sp>
         <p:nvSpPr>
-          <p:cNvPr id="249" name="Google Shape;249;g5ce966834a_4_18:notes"/>
+          <p:cNvPr id="252" name="Google Shape;252;g5ce966834a_4_18:notes"/>
           <p:cNvSpPr/>
           <p:nvPr>
             <p:ph idx="2" type="sldImg"/>
@@ -1771,7 +1771,7 @@
       </p:sp>
       <p:sp>
         <p:nvSpPr>
-          <p:cNvPr id="250" name="Google Shape;250;g5ce966834a_4_18:notes"/>
+          <p:cNvPr id="253" name="Google Shape;253;g5ce966834a_4_18:notes"/>
           <p:cNvSpPr txBox="1"/>
           <p:nvPr>
             <p:ph idx="1" type="body"/>
@@ -11211,8 +11211,36 @@
         </p:blipFill>
         <p:spPr>
           <a:xfrm>
-            <a:off x="219125" y="233125"/>
-            <a:ext cx="8718574" cy="3939900"/>
+            <a:off x="423275" y="233125"/>
+            <a:ext cx="8472350" cy="3860925"/>
+          </a:xfrm>
+          <a:prstGeom prst="rect">
+            <a:avLst/>
+          </a:prstGeom>
+          <a:noFill/>
+          <a:ln>
+            <a:noFill/>
+          </a:ln>
+        </p:spPr>
+      </p:pic>
+      <p:pic>
+        <p:nvPicPr>
+          <p:cNvPr id="198" name="Google Shape;198;p22"/>
+          <p:cNvPicPr preferRelativeResize="0"/>
+          <p:nvPr/>
+        </p:nvPicPr>
+        <p:blipFill>
+          <a:blip r:embed="rId4">
+            <a:alphaModFix/>
+          </a:blip>
+          <a:stretch>
+            <a:fillRect/>
+          </a:stretch>
+        </p:blipFill>
+        <p:spPr>
+          <a:xfrm>
+            <a:off x="5939250" y="3609675"/>
+            <a:ext cx="2956376" cy="1199400"/>
           </a:xfrm>
           <a:prstGeom prst="rect">
             <a:avLst/>
@@ -11236,7 +11264,7 @@
   <p:cSld>
     <p:spTree>
       <p:nvGrpSpPr>
-        <p:cNvPr id="201" name="Shape 201"/>
+        <p:cNvPr id="202" name="Shape 202"/>
         <p:cNvGrpSpPr/>
         <p:nvPr/>
       </p:nvGrpSpPr>
@@ -11250,7 +11278,7 @@
       </p:grpSpPr>
       <p:pic>
         <p:nvPicPr>
-          <p:cNvPr id="202" name="Google Shape;202;p23"/>
+          <p:cNvPr id="203" name="Google Shape;203;p23"/>
           <p:cNvPicPr preferRelativeResize="0"/>
           <p:nvPr/>
         </p:nvPicPr>
@@ -11266,6 +11294,34 @@
           <a:xfrm>
             <a:off x="207575" y="103800"/>
             <a:ext cx="8718600" cy="3953975"/>
+          </a:xfrm>
+          <a:prstGeom prst="rect">
+            <a:avLst/>
+          </a:prstGeom>
+          <a:noFill/>
+          <a:ln>
+            <a:noFill/>
+          </a:ln>
+        </p:spPr>
+      </p:pic>
+      <p:pic>
+        <p:nvPicPr>
+          <p:cNvPr id="204" name="Google Shape;204;p23"/>
+          <p:cNvPicPr preferRelativeResize="0"/>
+          <p:nvPr/>
+        </p:nvPicPr>
+        <p:blipFill>
+          <a:blip r:embed="rId4">
+            <a:alphaModFix/>
+          </a:blip>
+          <a:stretch>
+            <a:fillRect/>
+          </a:stretch>
+        </p:blipFill>
+        <p:spPr>
+          <a:xfrm>
+            <a:off x="5777800" y="3736525"/>
+            <a:ext cx="3148374" cy="1132200"/>
           </a:xfrm>
           <a:prstGeom prst="rect">
             <a:avLst/>
@@ -11289,7 +11345,7 @@
   <p:cSld>
     <p:spTree>
       <p:nvGrpSpPr>
-        <p:cNvPr id="206" name="Shape 206"/>
+        <p:cNvPr id="208" name="Shape 208"/>
         <p:cNvGrpSpPr/>
         <p:nvPr/>
       </p:nvGrpSpPr>
@@ -11303,7 +11359,7 @@
       </p:grpSpPr>
       <p:pic>
         <p:nvPicPr>
-          <p:cNvPr id="207" name="Google Shape;207;p24"/>
+          <p:cNvPr id="209" name="Google Shape;209;p24"/>
           <p:cNvPicPr preferRelativeResize="0"/>
           <p:nvPr/>
         </p:nvPicPr>
@@ -11317,8 +11373,36 @@
         </p:blipFill>
         <p:spPr>
           <a:xfrm>
-            <a:off x="207575" y="152400"/>
-            <a:ext cx="8730125" cy="4197325"/>
+            <a:off x="207575" y="196750"/>
+            <a:ext cx="8314950" cy="3997726"/>
+          </a:xfrm>
+          <a:prstGeom prst="rect">
+            <a:avLst/>
+          </a:prstGeom>
+          <a:noFill/>
+          <a:ln>
+            <a:noFill/>
+          </a:ln>
+        </p:spPr>
+      </p:pic>
+      <p:pic>
+        <p:nvPicPr>
+          <p:cNvPr id="210" name="Google Shape;210;p24"/>
+          <p:cNvPicPr preferRelativeResize="0"/>
+          <p:nvPr/>
+        </p:nvPicPr>
+        <p:blipFill>
+          <a:blip r:embed="rId4">
+            <a:alphaModFix/>
+          </a:blip>
+          <a:stretch>
+            <a:fillRect/>
+          </a:stretch>
+        </p:blipFill>
+        <p:spPr>
+          <a:xfrm>
+            <a:off x="6239075" y="3855900"/>
+            <a:ext cx="2710150" cy="982950"/>
           </a:xfrm>
           <a:prstGeom prst="rect">
             <a:avLst/>
@@ -11342,7 +11426,7 @@
   <p:cSld>
     <p:spTree>
       <p:nvGrpSpPr>
-        <p:cNvPr id="211" name="Shape 211"/>
+        <p:cNvPr id="214" name="Shape 214"/>
         <p:cNvGrpSpPr/>
         <p:nvPr/>
       </p:nvGrpSpPr>
@@ -11356,7 +11440,7 @@
       </p:grpSpPr>
       <p:pic>
         <p:nvPicPr>
-          <p:cNvPr id="212" name="Google Shape;212;p25"/>
+          <p:cNvPr id="215" name="Google Shape;215;p25"/>
           <p:cNvPicPr preferRelativeResize="0"/>
           <p:nvPr/>
         </p:nvPicPr>
@@ -11384,7 +11468,7 @@
       </p:pic>
       <p:pic>
         <p:nvPicPr>
-          <p:cNvPr id="213" name="Google Shape;213;p25"/>
+          <p:cNvPr id="216" name="Google Shape;216;p25"/>
           <p:cNvPicPr preferRelativeResize="0"/>
           <p:nvPr/>
         </p:nvPicPr>
@@ -11412,7 +11496,7 @@
       </p:pic>
       <p:sp>
         <p:nvSpPr>
-          <p:cNvPr id="214" name="Google Shape;214;p25"/>
+          <p:cNvPr id="217" name="Google Shape;217;p25"/>
           <p:cNvSpPr txBox="1"/>
           <p:nvPr>
             <p:ph idx="1" type="body"/>
@@ -11463,7 +11547,7 @@
   <p:cSld>
     <p:spTree>
       <p:nvGrpSpPr>
-        <p:cNvPr id="218" name="Shape 218"/>
+        <p:cNvPr id="221" name="Shape 221"/>
         <p:cNvGrpSpPr/>
         <p:nvPr/>
       </p:nvGrpSpPr>
@@ -11477,7 +11561,7 @@
       </p:grpSpPr>
       <p:pic>
         <p:nvPicPr>
-          <p:cNvPr id="219" name="Google Shape;219;p26"/>
+          <p:cNvPr id="222" name="Google Shape;222;p26"/>
           <p:cNvPicPr preferRelativeResize="0"/>
           <p:nvPr/>
         </p:nvPicPr>
@@ -11505,7 +11589,7 @@
       </p:pic>
       <p:sp>
         <p:nvSpPr>
-          <p:cNvPr id="220" name="Google Shape;220;p26"/>
+          <p:cNvPr id="223" name="Google Shape;223;p26"/>
           <p:cNvSpPr txBox="1"/>
           <p:nvPr/>
         </p:nvSpPr>
@@ -11562,7 +11646,7 @@
   <p:cSld>
     <p:spTree>
       <p:nvGrpSpPr>
-        <p:cNvPr id="224" name="Shape 224"/>
+        <p:cNvPr id="227" name="Shape 227"/>
         <p:cNvGrpSpPr/>
         <p:nvPr/>
       </p:nvGrpSpPr>
@@ -11576,7 +11660,7 @@
       </p:grpSpPr>
       <p:pic>
         <p:nvPicPr>
-          <p:cNvPr id="225" name="Google Shape;225;p27"/>
+          <p:cNvPr id="228" name="Google Shape;228;p27"/>
           <p:cNvPicPr preferRelativeResize="0"/>
           <p:nvPr/>
         </p:nvPicPr>
@@ -11604,7 +11688,7 @@
       </p:pic>
       <p:pic>
         <p:nvPicPr>
-          <p:cNvPr id="226" name="Google Shape;226;p27"/>
+          <p:cNvPr id="229" name="Google Shape;229;p27"/>
           <p:cNvPicPr preferRelativeResize="0"/>
           <p:nvPr/>
         </p:nvPicPr>
@@ -11632,7 +11716,7 @@
       </p:pic>
       <p:sp>
         <p:nvSpPr>
-          <p:cNvPr id="227" name="Google Shape;227;p27"/>
+          <p:cNvPr id="230" name="Google Shape;230;p27"/>
           <p:cNvSpPr txBox="1"/>
           <p:nvPr>
             <p:ph idx="1" type="body"/>
@@ -11683,7 +11767,7 @@
   <p:cSld>
     <p:spTree>
       <p:nvGrpSpPr>
-        <p:cNvPr id="231" name="Shape 231"/>
+        <p:cNvPr id="234" name="Shape 234"/>
         <p:cNvGrpSpPr/>
         <p:nvPr/>
       </p:nvGrpSpPr>
@@ -11697,7 +11781,7 @@
       </p:grpSpPr>
       <p:sp>
         <p:nvSpPr>
-          <p:cNvPr id="232" name="Google Shape;232;p28"/>
+          <p:cNvPr id="235" name="Google Shape;235;p28"/>
           <p:cNvSpPr txBox="1"/>
           <p:nvPr>
             <p:ph idx="1" type="body"/>
@@ -11881,7 +11965,7 @@
       </p:sp>
       <p:pic>
         <p:nvPicPr>
-          <p:cNvPr id="233" name="Google Shape;233;p28"/>
+          <p:cNvPr id="236" name="Google Shape;236;p28"/>
           <p:cNvPicPr preferRelativeResize="0"/>
           <p:nvPr/>
         </p:nvPicPr>
@@ -11920,7 +12004,7 @@
   <p:cSld>
     <p:spTree>
       <p:nvGrpSpPr>
-        <p:cNvPr id="237" name="Shape 237"/>
+        <p:cNvPr id="240" name="Shape 240"/>
         <p:cNvGrpSpPr/>
         <p:nvPr/>
       </p:nvGrpSpPr>
@@ -11934,7 +12018,7 @@
       </p:grpSpPr>
       <p:sp>
         <p:nvSpPr>
-          <p:cNvPr id="238" name="Google Shape;238;p29"/>
+          <p:cNvPr id="241" name="Google Shape;241;p29"/>
           <p:cNvSpPr txBox="1"/>
           <p:nvPr>
             <p:ph idx="1" type="body"/>
@@ -11974,7 +12058,7 @@
       </p:sp>
       <p:pic>
         <p:nvPicPr>
-          <p:cNvPr id="239" name="Google Shape;239;p29"/>
+          <p:cNvPr id="242" name="Google Shape;242;p29"/>
           <p:cNvPicPr preferRelativeResize="0"/>
           <p:nvPr/>
         </p:nvPicPr>
@@ -12002,7 +12086,7 @@
       </p:pic>
       <p:sp>
         <p:nvSpPr>
-          <p:cNvPr id="240" name="Google Shape;240;p29"/>
+          <p:cNvPr id="243" name="Google Shape;243;p29"/>
           <p:cNvSpPr txBox="1"/>
           <p:nvPr/>
         </p:nvSpPr>
@@ -12200,7 +12284,7 @@
       </p:sp>
       <p:sp>
         <p:nvSpPr>
-          <p:cNvPr id="241" name="Google Shape;241;p29"/>
+          <p:cNvPr id="244" name="Google Shape;244;p29"/>
           <p:cNvSpPr txBox="1"/>
           <p:nvPr/>
         </p:nvSpPr>
@@ -12263,7 +12347,7 @@
   <p:cSld>
     <p:spTree>
       <p:nvGrpSpPr>
-        <p:cNvPr id="245" name="Shape 245"/>
+        <p:cNvPr id="248" name="Shape 248"/>
         <p:cNvGrpSpPr/>
         <p:nvPr/>
       </p:nvGrpSpPr>
@@ -12277,7 +12361,7 @@
       </p:grpSpPr>
       <p:sp>
         <p:nvSpPr>
-          <p:cNvPr id="246" name="Google Shape;246;p30"/>
+          <p:cNvPr id="249" name="Google Shape;249;p30"/>
           <p:cNvSpPr txBox="1"/>
           <p:nvPr>
             <p:ph idx="1" type="body"/>
@@ -12317,7 +12401,7 @@
       </p:sp>
       <p:sp>
         <p:nvSpPr>
-          <p:cNvPr id="247" name="Google Shape;247;p30"/>
+          <p:cNvPr id="250" name="Google Shape;250;p30"/>
           <p:cNvSpPr txBox="1"/>
           <p:nvPr/>
         </p:nvSpPr>
@@ -12534,7 +12618,7 @@
   <p:cSld>
     <p:spTree>
       <p:nvGrpSpPr>
-        <p:cNvPr id="251" name="Shape 251"/>
+        <p:cNvPr id="254" name="Shape 254"/>
         <p:cNvGrpSpPr/>
         <p:nvPr/>
       </p:nvGrpSpPr>
@@ -12548,7 +12632,7 @@
       </p:grpSpPr>
       <p:sp>
         <p:nvSpPr>
-          <p:cNvPr id="252" name="Google Shape;252;p31"/>
+          <p:cNvPr id="255" name="Google Shape;255;p31"/>
           <p:cNvSpPr txBox="1"/>
           <p:nvPr/>
         </p:nvSpPr>
@@ -12620,7 +12704,7 @@
       </p:sp>
       <p:pic>
         <p:nvPicPr>
-          <p:cNvPr id="253" name="Google Shape;253;p31"/>
+          <p:cNvPr id="256" name="Google Shape;256;p31"/>
           <p:cNvPicPr preferRelativeResize="0"/>
           <p:nvPr/>
         </p:nvPicPr>
@@ -15207,6 +15291,285 @@
 </file>
 
 <file path=ppt/theme/theme1.xml><?xml version="1.0" encoding="utf-8"?>
+<a:theme xmlns:a="http://schemas.openxmlformats.org/drawingml/2006/main" xmlns:r="http://schemas.openxmlformats.org/officeDocument/2006/relationships">
+  <a:themeElements>
+    <a:clrScheme name="Default">
+      <a:dk1>
+        <a:srgbClr val="000000"/>
+      </a:dk1>
+      <a:lt1>
+        <a:srgbClr val="FFFFFF"/>
+      </a:lt1>
+      <a:dk2>
+        <a:srgbClr val="158158"/>
+      </a:dk2>
+      <a:lt2>
+        <a:srgbClr val="F3F3F3"/>
+      </a:lt2>
+      <a:accent1>
+        <a:srgbClr val="058DC7"/>
+      </a:accent1>
+      <a:accent2>
+        <a:srgbClr val="50B432"/>
+      </a:accent2>
+      <a:accent3>
+        <a:srgbClr val="ED561B"/>
+      </a:accent3>
+      <a:accent4>
+        <a:srgbClr val="EDEF00"/>
+      </a:accent4>
+      <a:accent5>
+        <a:srgbClr val="24CBE5"/>
+      </a:accent5>
+      <a:accent6>
+        <a:srgbClr val="64E572"/>
+      </a:accent6>
+      <a:hlink>
+        <a:srgbClr val="2200CC"/>
+      </a:hlink>
+      <a:folHlink>
+        <a:srgbClr val="551A8B"/>
+      </a:folHlink>
+    </a:clrScheme>
+    <a:fontScheme name="Office">
+      <a:majorFont>
+        <a:latin typeface="Arial"/>
+        <a:ea typeface=""/>
+        <a:cs typeface=""/>
+        <a:font script="Jpan" typeface="ＭＳ Ｐゴシック"/>
+        <a:font script="Hang" typeface="맑은 고딕"/>
+        <a:font script="Hans" typeface="宋体"/>
+        <a:font script="Hant" typeface="新細明體"/>
+        <a:font script="Arab" typeface="Times New Roman"/>
+        <a:font script="Hebr" typeface="Times New Roman"/>
+        <a:font script="Thai" typeface="Angsana New"/>
+        <a:font script="Ethi" typeface="Nyala"/>
+        <a:font script="Beng" typeface="Vrinda"/>
+        <a:font script="Gujr" typeface="Shruti"/>
+        <a:font script="Khmr" typeface="MoolBoran"/>
+        <a:font script="Knda" typeface="Tunga"/>
+        <a:font script="Guru" typeface="Raavi"/>
+        <a:font script="Cans" typeface="Euphemia"/>
+        <a:font script="Cher" typeface="Plantagenet Cherokee"/>
+        <a:font script="Yiii" typeface="Microsoft Yi Baiti"/>
+        <a:font script="Tibt" typeface="Microsoft Himalaya"/>
+        <a:font script="Thaa" typeface="MV Boli"/>
+        <a:font script="Deva" typeface="Mangal"/>
+        <a:font script="Telu" typeface="Gautami"/>
+        <a:font script="Taml" typeface="Latha"/>
+        <a:font script="Syrc" typeface="Estrangelo Edessa"/>
+        <a:font script="Orya" typeface="Kalinga"/>
+        <a:font script="Mlym" typeface="Kartika"/>
+        <a:font script="Laoo" typeface="DokChampa"/>
+        <a:font script="Sinh" typeface="Iskoola Pota"/>
+        <a:font script="Mong" typeface="Mongolian Baiti"/>
+        <a:font script="Viet" typeface="Times New Roman"/>
+        <a:font script="Uigh" typeface="Microsoft Uighur"/>
+        <a:font script="Geor" typeface="Sylfaen"/>
+      </a:majorFont>
+      <a:minorFont>
+        <a:latin typeface="Arial"/>
+        <a:ea typeface=""/>
+        <a:cs typeface=""/>
+        <a:font script="Jpan" typeface="ＭＳ Ｐゴシック"/>
+        <a:font script="Hang" typeface="맑은 고딕"/>
+        <a:font script="Hans" typeface="宋体"/>
+        <a:font script="Hant" typeface="新細明體"/>
+        <a:font script="Arab" typeface="Arial"/>
+        <a:font script="Hebr" typeface="Arial"/>
+        <a:font script="Thai" typeface="Cordia New"/>
+        <a:font script="Ethi" typeface="Nyala"/>
+        <a:font script="Beng" typeface="Vrinda"/>
+        <a:font script="Gujr" typeface="Shruti"/>
+        <a:font script="Khmr" typeface="DaunPenh"/>
+        <a:font script="Knda" typeface="Tunga"/>
+        <a:font script="Guru" typeface="Raavi"/>
+        <a:font script="Cans" typeface="Euphemia"/>
+        <a:font script="Cher" typeface="Plantagenet Cherokee"/>
+        <a:font script="Yiii" typeface="Microsoft Yi Baiti"/>
+        <a:font script="Tibt" typeface="Microsoft Himalaya"/>
+        <a:font script="Thaa" typeface="MV Boli"/>
+        <a:font script="Deva" typeface="Mangal"/>
+        <a:font script="Telu" typeface="Gautami"/>
+        <a:font script="Taml" typeface="Latha"/>
+        <a:font script="Syrc" typeface="Estrangelo Edessa"/>
+        <a:font script="Orya" typeface="Kalinga"/>
+        <a:font script="Mlym" typeface="Kartika"/>
+        <a:font script="Laoo" typeface="DokChampa"/>
+        <a:font script="Sinh" typeface="Iskoola Pota"/>
+        <a:font script="Mong" typeface="Mongolian Baiti"/>
+        <a:font script="Viet" typeface="Arial"/>
+        <a:font script="Uigh" typeface="Microsoft Uighur"/>
+        <a:font script="Geor" typeface="Sylfaen"/>
+      </a:minorFont>
+    </a:fontScheme>
+    <a:fmtScheme name="Office">
+      <a:fillStyleLst>
+        <a:solidFill>
+          <a:schemeClr val="phClr"/>
+        </a:solidFill>
+        <a:gradFill rotWithShape="1">
+          <a:gsLst>
+            <a:gs pos="0">
+              <a:schemeClr val="phClr">
+                <a:tint val="50000"/>
+                <a:satMod val="300000"/>
+              </a:schemeClr>
+            </a:gs>
+            <a:gs pos="35000">
+              <a:schemeClr val="phClr">
+                <a:tint val="37000"/>
+                <a:satMod val="300000"/>
+              </a:schemeClr>
+            </a:gs>
+            <a:gs pos="100000">
+              <a:schemeClr val="phClr">
+                <a:tint val="15000"/>
+                <a:satMod val="350000"/>
+              </a:schemeClr>
+            </a:gs>
+          </a:gsLst>
+          <a:lin ang="16200000" scaled="1"/>
+        </a:gradFill>
+        <a:gradFill rotWithShape="1">
+          <a:gsLst>
+            <a:gs pos="0">
+              <a:schemeClr val="phClr">
+                <a:tint val="100000"/>
+                <a:shade val="100000"/>
+                <a:satMod val="130000"/>
+              </a:schemeClr>
+            </a:gs>
+            <a:gs pos="100000">
+              <a:schemeClr val="phClr">
+                <a:tint val="50000"/>
+                <a:shade val="100000"/>
+                <a:satMod val="350000"/>
+              </a:schemeClr>
+            </a:gs>
+          </a:gsLst>
+          <a:lin ang="16200000" scaled="0"/>
+        </a:gradFill>
+      </a:fillStyleLst>
+      <a:lnStyleLst>
+        <a:ln w="9525" cap="flat" cmpd="sng" algn="ctr">
+          <a:solidFill>
+            <a:schemeClr val="phClr">
+              <a:shade val="95000"/>
+              <a:satMod val="105000"/>
+            </a:schemeClr>
+          </a:solidFill>
+          <a:prstDash val="solid"/>
+        </a:ln>
+        <a:ln w="25400" cap="flat" cmpd="sng" algn="ctr">
+          <a:solidFill>
+            <a:schemeClr val="phClr"/>
+          </a:solidFill>
+          <a:prstDash val="solid"/>
+        </a:ln>
+        <a:ln w="38100" cap="flat" cmpd="sng" algn="ctr">
+          <a:solidFill>
+            <a:schemeClr val="phClr"/>
+          </a:solidFill>
+          <a:prstDash val="solid"/>
+        </a:ln>
+      </a:lnStyleLst>
+      <a:effectStyleLst>
+        <a:effectStyle>
+          <a:effectLst>
+            <a:outerShdw blurRad="40000" dist="20000" dir="5400000" rotWithShape="0">
+              <a:srgbClr val="000000">
+                <a:alpha val="38000"/>
+              </a:srgbClr>
+            </a:outerShdw>
+          </a:effectLst>
+        </a:effectStyle>
+        <a:effectStyle>
+          <a:effectLst>
+            <a:outerShdw blurRad="40000" dist="23000" dir="5400000" rotWithShape="0">
+              <a:srgbClr val="000000">
+                <a:alpha val="35000"/>
+              </a:srgbClr>
+            </a:outerShdw>
+          </a:effectLst>
+        </a:effectStyle>
+        <a:effectStyle>
+          <a:effectLst>
+            <a:outerShdw blurRad="40000" dist="23000" dir="5400000" rotWithShape="0">
+              <a:srgbClr val="000000">
+                <a:alpha val="35000"/>
+              </a:srgbClr>
+            </a:outerShdw>
+          </a:effectLst>
+          <a:scene3d>
+            <a:camera prst="orthographicFront">
+              <a:rot lat="0" lon="0" rev="0"/>
+            </a:camera>
+            <a:lightRig rig="threePt" dir="t">
+              <a:rot lat="0" lon="0" rev="1200000"/>
+            </a:lightRig>
+          </a:scene3d>
+          <a:sp3d>
+            <a:bevelT w="63500" h="25400"/>
+          </a:sp3d>
+        </a:effectStyle>
+      </a:effectStyleLst>
+      <a:bgFillStyleLst>
+        <a:solidFill>
+          <a:schemeClr val="phClr"/>
+        </a:solidFill>
+        <a:gradFill rotWithShape="1">
+          <a:gsLst>
+            <a:gs pos="0">
+              <a:schemeClr val="phClr">
+                <a:tint val="40000"/>
+                <a:satMod val="350000"/>
+              </a:schemeClr>
+            </a:gs>
+            <a:gs pos="40000">
+              <a:schemeClr val="phClr">
+                <a:tint val="45000"/>
+                <a:shade val="99000"/>
+                <a:satMod val="350000"/>
+              </a:schemeClr>
+            </a:gs>
+            <a:gs pos="100000">
+              <a:schemeClr val="phClr">
+                <a:shade val="20000"/>
+                <a:satMod val="255000"/>
+              </a:schemeClr>
+            </a:gs>
+          </a:gsLst>
+          <a:path path="circle">
+            <a:fillToRect l="50000" t="-80000" r="50000" b="180000"/>
+          </a:path>
+        </a:gradFill>
+        <a:gradFill rotWithShape="1">
+          <a:gsLst>
+            <a:gs pos="0">
+              <a:schemeClr val="phClr">
+                <a:tint val="80000"/>
+                <a:satMod val="300000"/>
+              </a:schemeClr>
+            </a:gs>
+            <a:gs pos="100000">
+              <a:schemeClr val="phClr">
+                <a:shade val="30000"/>
+                <a:satMod val="200000"/>
+              </a:schemeClr>
+            </a:gs>
+          </a:gsLst>
+          <a:path path="circle">
+            <a:fillToRect l="50000" t="50000" r="50000" b="50000"/>
+          </a:path>
+        </a:gradFill>
+      </a:bgFillStyleLst>
+    </a:fmtScheme>
+  </a:themeElements>
+</a:theme>
+</file>
+
+<file path=ppt/theme/theme2.xml><?xml version="1.0" encoding="utf-8"?>
 <a:theme xmlns:a="http://schemas.openxmlformats.org/drawingml/2006/main" xmlns:r="http://schemas.openxmlformats.org/officeDocument/2006/relationships" name="Shift">
   <a:themeElements>
     <a:clrScheme name="Shift">
@@ -15483,283 +15846,4 @@
     </a:fmtScheme>
   </a:themeElements>
 </a:theme>
-</file>
-
-<file path=ppt/theme/theme2.xml><?xml version="1.0" encoding="utf-8"?>
-<a:theme xmlns:a="http://schemas.openxmlformats.org/drawingml/2006/main" xmlns:r="http://schemas.openxmlformats.org/officeDocument/2006/relationships">
-  <a:themeElements>
-    <a:clrScheme name="Default">
-      <a:dk1>
-        <a:srgbClr val="000000"/>
-      </a:dk1>
-      <a:lt1>
-        <a:srgbClr val="FFFFFF"/>
-      </a:lt1>
-      <a:dk2>
-        <a:srgbClr val="158158"/>
-      </a:dk2>
-      <a:lt2>
-        <a:srgbClr val="F3F3F3"/>
-      </a:lt2>
-      <a:accent1>
-        <a:srgbClr val="058DC7"/>
-      </a:accent1>
-      <a:accent2>
-        <a:srgbClr val="50B432"/>
-      </a:accent2>
-      <a:accent3>
-        <a:srgbClr val="ED561B"/>
-      </a:accent3>
-      <a:accent4>
-        <a:srgbClr val="EDEF00"/>
-      </a:accent4>
-      <a:accent5>
-        <a:srgbClr val="24CBE5"/>
-      </a:accent5>
-      <a:accent6>
-        <a:srgbClr val="64E572"/>
-      </a:accent6>
-      <a:hlink>
-        <a:srgbClr val="2200CC"/>
-      </a:hlink>
-      <a:folHlink>
-        <a:srgbClr val="551A8B"/>
-      </a:folHlink>
-    </a:clrScheme>
-    <a:fontScheme name="Office">
-      <a:majorFont>
-        <a:latin typeface="Arial"/>
-        <a:ea typeface=""/>
-        <a:cs typeface=""/>
-        <a:font script="Jpan" typeface="ＭＳ Ｐゴシック"/>
-        <a:font script="Hang" typeface="맑은 고딕"/>
-        <a:font script="Hans" typeface="宋体"/>
-        <a:font script="Hant" typeface="新細明體"/>
-        <a:font script="Arab" typeface="Times New Roman"/>
-        <a:font script="Hebr" typeface="Times New Roman"/>
-        <a:font script="Thai" typeface="Angsana New"/>
-        <a:font script="Ethi" typeface="Nyala"/>
-        <a:font script="Beng" typeface="Vrinda"/>
-        <a:font script="Gujr" typeface="Shruti"/>
-        <a:font script="Khmr" typeface="MoolBoran"/>
-        <a:font script="Knda" typeface="Tunga"/>
-        <a:font script="Guru" typeface="Raavi"/>
-        <a:font script="Cans" typeface="Euphemia"/>
-        <a:font script="Cher" typeface="Plantagenet Cherokee"/>
-        <a:font script="Yiii" typeface="Microsoft Yi Baiti"/>
-        <a:font script="Tibt" typeface="Microsoft Himalaya"/>
-        <a:font script="Thaa" typeface="MV Boli"/>
-        <a:font script="Deva" typeface="Mangal"/>
-        <a:font script="Telu" typeface="Gautami"/>
-        <a:font script="Taml" typeface="Latha"/>
-        <a:font script="Syrc" typeface="Estrangelo Edessa"/>
-        <a:font script="Orya" typeface="Kalinga"/>
-        <a:font script="Mlym" typeface="Kartika"/>
-        <a:font script="Laoo" typeface="DokChampa"/>
-        <a:font script="Sinh" typeface="Iskoola Pota"/>
-        <a:font script="Mong" typeface="Mongolian Baiti"/>
-        <a:font script="Viet" typeface="Times New Roman"/>
-        <a:font script="Uigh" typeface="Microsoft Uighur"/>
-        <a:font script="Geor" typeface="Sylfaen"/>
-      </a:majorFont>
-      <a:minorFont>
-        <a:latin typeface="Arial"/>
-        <a:ea typeface=""/>
-        <a:cs typeface=""/>
-        <a:font script="Jpan" typeface="ＭＳ Ｐゴシック"/>
-        <a:font script="Hang" typeface="맑은 고딕"/>
-        <a:font script="Hans" typeface="宋体"/>
-        <a:font script="Hant" typeface="新細明體"/>
-        <a:font script="Arab" typeface="Arial"/>
-        <a:font script="Hebr" typeface="Arial"/>
-        <a:font script="Thai" typeface="Cordia New"/>
-        <a:font script="Ethi" typeface="Nyala"/>
-        <a:font script="Beng" typeface="Vrinda"/>
-        <a:font script="Gujr" typeface="Shruti"/>
-        <a:font script="Khmr" typeface="DaunPenh"/>
-        <a:font script="Knda" typeface="Tunga"/>
-        <a:font script="Guru" typeface="Raavi"/>
-        <a:font script="Cans" typeface="Euphemia"/>
-        <a:font script="Cher" typeface="Plantagenet Cherokee"/>
-        <a:font script="Yiii" typeface="Microsoft Yi Baiti"/>
-        <a:font script="Tibt" typeface="Microsoft Himalaya"/>
-        <a:font script="Thaa" typeface="MV Boli"/>
-        <a:font script="Deva" typeface="Mangal"/>
-        <a:font script="Telu" typeface="Gautami"/>
-        <a:font script="Taml" typeface="Latha"/>
-        <a:font script="Syrc" typeface="Estrangelo Edessa"/>
-        <a:font script="Orya" typeface="Kalinga"/>
-        <a:font script="Mlym" typeface="Kartika"/>
-        <a:font script="Laoo" typeface="DokChampa"/>
-        <a:font script="Sinh" typeface="Iskoola Pota"/>
-        <a:font script="Mong" typeface="Mongolian Baiti"/>
-        <a:font script="Viet" typeface="Arial"/>
-        <a:font script="Uigh" typeface="Microsoft Uighur"/>
-        <a:font script="Geor" typeface="Sylfaen"/>
-      </a:minorFont>
-    </a:fontScheme>
-    <a:fmtScheme name="Office">
-      <a:fillStyleLst>
-        <a:solidFill>
-          <a:schemeClr val="phClr"/>
-        </a:solidFill>
-        <a:gradFill rotWithShape="1">
-          <a:gsLst>
-            <a:gs pos="0">
-              <a:schemeClr val="phClr">
-                <a:tint val="50000"/>
-                <a:satMod val="300000"/>
-              </a:schemeClr>
-            </a:gs>
-            <a:gs pos="35000">
-              <a:schemeClr val="phClr">
-                <a:tint val="37000"/>
-                <a:satMod val="300000"/>
-              </a:schemeClr>
-            </a:gs>
-            <a:gs pos="100000">
-              <a:schemeClr val="phClr">
-                <a:tint val="15000"/>
-                <a:satMod val="350000"/>
-              </a:schemeClr>
-            </a:gs>
-          </a:gsLst>
-          <a:lin ang="16200000" scaled="1"/>
-        </a:gradFill>
-        <a:gradFill rotWithShape="1">
-          <a:gsLst>
-            <a:gs pos="0">
-              <a:schemeClr val="phClr">
-                <a:tint val="100000"/>
-                <a:shade val="100000"/>
-                <a:satMod val="130000"/>
-              </a:schemeClr>
-            </a:gs>
-            <a:gs pos="100000">
-              <a:schemeClr val="phClr">
-                <a:tint val="50000"/>
-                <a:shade val="100000"/>
-                <a:satMod val="350000"/>
-              </a:schemeClr>
-            </a:gs>
-          </a:gsLst>
-          <a:lin ang="16200000" scaled="0"/>
-        </a:gradFill>
-      </a:fillStyleLst>
-      <a:lnStyleLst>
-        <a:ln w="9525" cap="flat" cmpd="sng" algn="ctr">
-          <a:solidFill>
-            <a:schemeClr val="phClr">
-              <a:shade val="95000"/>
-              <a:satMod val="105000"/>
-            </a:schemeClr>
-          </a:solidFill>
-          <a:prstDash val="solid"/>
-        </a:ln>
-        <a:ln w="25400" cap="flat" cmpd="sng" algn="ctr">
-          <a:solidFill>
-            <a:schemeClr val="phClr"/>
-          </a:solidFill>
-          <a:prstDash val="solid"/>
-        </a:ln>
-        <a:ln w="38100" cap="flat" cmpd="sng" algn="ctr">
-          <a:solidFill>
-            <a:schemeClr val="phClr"/>
-          </a:solidFill>
-          <a:prstDash val="solid"/>
-        </a:ln>
-      </a:lnStyleLst>
-      <a:effectStyleLst>
-        <a:effectStyle>
-          <a:effectLst>
-            <a:outerShdw blurRad="40000" dist="20000" dir="5400000" rotWithShape="0">
-              <a:srgbClr val="000000">
-                <a:alpha val="38000"/>
-              </a:srgbClr>
-            </a:outerShdw>
-          </a:effectLst>
-        </a:effectStyle>
-        <a:effectStyle>
-          <a:effectLst>
-            <a:outerShdw blurRad="40000" dist="23000" dir="5400000" rotWithShape="0">
-              <a:srgbClr val="000000">
-                <a:alpha val="35000"/>
-              </a:srgbClr>
-            </a:outerShdw>
-          </a:effectLst>
-        </a:effectStyle>
-        <a:effectStyle>
-          <a:effectLst>
-            <a:outerShdw blurRad="40000" dist="23000" dir="5400000" rotWithShape="0">
-              <a:srgbClr val="000000">
-                <a:alpha val="35000"/>
-              </a:srgbClr>
-            </a:outerShdw>
-          </a:effectLst>
-          <a:scene3d>
-            <a:camera prst="orthographicFront">
-              <a:rot lat="0" lon="0" rev="0"/>
-            </a:camera>
-            <a:lightRig rig="threePt" dir="t">
-              <a:rot lat="0" lon="0" rev="1200000"/>
-            </a:lightRig>
-          </a:scene3d>
-          <a:sp3d>
-            <a:bevelT w="63500" h="25400"/>
-          </a:sp3d>
-        </a:effectStyle>
-      </a:effectStyleLst>
-      <a:bgFillStyleLst>
-        <a:solidFill>
-          <a:schemeClr val="phClr"/>
-        </a:solidFill>
-        <a:gradFill rotWithShape="1">
-          <a:gsLst>
-            <a:gs pos="0">
-              <a:schemeClr val="phClr">
-                <a:tint val="40000"/>
-                <a:satMod val="350000"/>
-              </a:schemeClr>
-            </a:gs>
-            <a:gs pos="40000">
-              <a:schemeClr val="phClr">
-                <a:tint val="45000"/>
-                <a:shade val="99000"/>
-                <a:satMod val="350000"/>
-              </a:schemeClr>
-            </a:gs>
-            <a:gs pos="100000">
-              <a:schemeClr val="phClr">
-                <a:shade val="20000"/>
-                <a:satMod val="255000"/>
-              </a:schemeClr>
-            </a:gs>
-          </a:gsLst>
-          <a:path path="circle">
-            <a:fillToRect l="50000" t="-80000" r="50000" b="180000"/>
-          </a:path>
-        </a:gradFill>
-        <a:gradFill rotWithShape="1">
-          <a:gsLst>
-            <a:gs pos="0">
-              <a:schemeClr val="phClr">
-                <a:tint val="80000"/>
-                <a:satMod val="300000"/>
-              </a:schemeClr>
-            </a:gs>
-            <a:gs pos="100000">
-              <a:schemeClr val="phClr">
-                <a:shade val="30000"/>
-                <a:satMod val="200000"/>
-              </a:schemeClr>
-            </a:gs>
-          </a:gsLst>
-          <a:path path="circle">
-            <a:fillToRect l="50000" t="50000" r="50000" b="50000"/>
-          </a:path>
-        </a:gradFill>
-      </a:bgFillStyleLst>
-    </a:fmtScheme>
-  </a:themeElements>
-</a:theme>
 </file>
</xml_diff>

<commit_message>
Adding some updated files
</commit_message>
<xml_diff>
--- a/BRFSS.pptx
+++ b/BRFSS.pptx
@@ -12584,6 +12584,54 @@
             </a:endParaRPr>
           </a:p>
           <a:p>
+            <a:pPr indent="-330200" lvl="0" marL="457200" rtl="0" algn="l">
+              <a:spcBef>
+                <a:spcPts val="0"/>
+              </a:spcBef>
+              <a:spcAft>
+                <a:spcPts val="0"/>
+              </a:spcAft>
+              <a:buSzPts val="1600"/>
+              <a:buFont typeface="Calibri"/>
+              <a:buChar char="-"/>
+            </a:pPr>
+            <a:r>
+              <a:rPr lang="en" sz="1600">
+                <a:latin typeface="Calibri"/>
+                <a:ea typeface="Calibri"/>
+                <a:cs typeface="Calibri"/>
+                <a:sym typeface="Calibri"/>
+              </a:rPr>
+              <a:t>Usage of better visualization libraries in Python.</a:t>
+            </a:r>
+            <a:endParaRPr sz="1600">
+              <a:latin typeface="Calibri"/>
+              <a:ea typeface="Calibri"/>
+              <a:cs typeface="Calibri"/>
+              <a:sym typeface="Calibri"/>
+            </a:endParaRPr>
+          </a:p>
+          <a:p>
+            <a:pPr indent="0" lvl="0" marL="457200" rtl="0" algn="l">
+              <a:spcBef>
+                <a:spcPts val="0"/>
+              </a:spcBef>
+              <a:spcAft>
+                <a:spcPts val="0"/>
+              </a:spcAft>
+              <a:buNone/>
+            </a:pPr>
+            <a:r>
+              <a:t/>
+            </a:r>
+            <a:endParaRPr sz="1600">
+              <a:latin typeface="Calibri"/>
+              <a:ea typeface="Calibri"/>
+              <a:cs typeface="Calibri"/>
+              <a:sym typeface="Calibri"/>
+            </a:endParaRPr>
+          </a:p>
+          <a:p>
             <a:pPr indent="0" lvl="0" marL="0" rtl="0" algn="l">
               <a:spcBef>
                 <a:spcPts val="0"/>
@@ -12730,6 +12778,124 @@
           </a:ln>
         </p:spPr>
       </p:pic>
+      <p:sp>
+        <p:nvSpPr>
+          <p:cNvPr id="257" name="Google Shape;257;p31"/>
+          <p:cNvSpPr txBox="1"/>
+          <p:nvPr/>
+        </p:nvSpPr>
+        <p:spPr>
+          <a:xfrm>
+            <a:off x="5673975" y="3090700"/>
+            <a:ext cx="3102300" cy="1453200"/>
+          </a:xfrm>
+          <a:prstGeom prst="rect">
+            <a:avLst/>
+          </a:prstGeom>
+          <a:noFill/>
+          <a:ln>
+            <a:noFill/>
+          </a:ln>
+        </p:spPr>
+        <p:txBody>
+          <a:bodyPr anchorCtr="0" anchor="t" bIns="91425" lIns="91425" spcFirstLastPara="1" rIns="91425" wrap="square" tIns="91425">
+            <a:noAutofit/>
+          </a:bodyPr>
+          <a:lstStyle/>
+          <a:p>
+            <a:pPr indent="0" lvl="0" marL="0" rtl="0" algn="ctr">
+              <a:spcBef>
+                <a:spcPts val="0"/>
+              </a:spcBef>
+              <a:spcAft>
+                <a:spcPts val="0"/>
+              </a:spcAft>
+              <a:buNone/>
+            </a:pPr>
+            <a:r>
+              <a:rPr lang="en" sz="1800">
+                <a:latin typeface="Calibri"/>
+                <a:ea typeface="Calibri"/>
+                <a:cs typeface="Calibri"/>
+                <a:sym typeface="Calibri"/>
+              </a:rPr>
+              <a:t>Thank You</a:t>
+            </a:r>
+            <a:endParaRPr sz="1800">
+              <a:latin typeface="Calibri"/>
+              <a:ea typeface="Calibri"/>
+              <a:cs typeface="Calibri"/>
+              <a:sym typeface="Calibri"/>
+            </a:endParaRPr>
+          </a:p>
+          <a:p>
+            <a:pPr indent="0" lvl="0" marL="0" rtl="0" algn="ctr">
+              <a:spcBef>
+                <a:spcPts val="0"/>
+              </a:spcBef>
+              <a:spcAft>
+                <a:spcPts val="0"/>
+              </a:spcAft>
+              <a:buNone/>
+            </a:pPr>
+            <a:r>
+              <a:t/>
+            </a:r>
+            <a:endParaRPr sz="1800">
+              <a:latin typeface="Calibri"/>
+              <a:ea typeface="Calibri"/>
+              <a:cs typeface="Calibri"/>
+              <a:sym typeface="Calibri"/>
+            </a:endParaRPr>
+          </a:p>
+          <a:p>
+            <a:pPr indent="0" lvl="0" marL="0" rtl="0" algn="ctr">
+              <a:spcBef>
+                <a:spcPts val="0"/>
+              </a:spcBef>
+              <a:spcAft>
+                <a:spcPts val="0"/>
+              </a:spcAft>
+              <a:buNone/>
+            </a:pPr>
+            <a:r>
+              <a:t/>
+            </a:r>
+            <a:endParaRPr sz="1800">
+              <a:latin typeface="Calibri"/>
+              <a:ea typeface="Calibri"/>
+              <a:cs typeface="Calibri"/>
+              <a:sym typeface="Calibri"/>
+            </a:endParaRPr>
+          </a:p>
+          <a:p>
+            <a:pPr indent="0" lvl="0" marL="0" rtl="0" algn="ctr">
+              <a:spcBef>
+                <a:spcPts val="0"/>
+              </a:spcBef>
+              <a:spcAft>
+                <a:spcPts val="0"/>
+              </a:spcAft>
+              <a:buNone/>
+            </a:pPr>
+            <a:r>
+              <a:rPr lang="en" sz="1800">
+                <a:latin typeface="Calibri"/>
+                <a:ea typeface="Calibri"/>
+                <a:cs typeface="Calibri"/>
+                <a:sym typeface="Calibri"/>
+              </a:rPr>
+              <a:t>Questions?</a:t>
+            </a:r>
+            <a:endParaRPr sz="1800">
+              <a:latin typeface="Calibri"/>
+              <a:ea typeface="Calibri"/>
+              <a:cs typeface="Calibri"/>
+              <a:sym typeface="Calibri"/>
+            </a:endParaRPr>
+          </a:p>
+        </p:txBody>
+      </p:sp>
     </p:spTree>
   </p:cSld>
   <p:clrMapOvr>
@@ -15291,6 +15457,285 @@
 </file>
 
 <file path=ppt/theme/theme1.xml><?xml version="1.0" encoding="utf-8"?>
+<a:theme xmlns:a="http://schemas.openxmlformats.org/drawingml/2006/main" xmlns:r="http://schemas.openxmlformats.org/officeDocument/2006/relationships" name="Shift">
+  <a:themeElements>
+    <a:clrScheme name="Shift">
+      <a:dk1>
+        <a:srgbClr val="FFFFFF"/>
+      </a:dk1>
+      <a:lt1>
+        <a:srgbClr val="AF7B51"/>
+      </a:lt1>
+      <a:dk2>
+        <a:srgbClr val="233A44"/>
+      </a:dk2>
+      <a:lt2>
+        <a:srgbClr val="D9D9D9"/>
+      </a:lt2>
+      <a:accent1>
+        <a:srgbClr val="00796B"/>
+      </a:accent1>
+      <a:accent2>
+        <a:srgbClr val="D9563F"/>
+      </a:accent2>
+      <a:accent3>
+        <a:srgbClr val="C4A15A"/>
+      </a:accent3>
+      <a:accent4>
+        <a:srgbClr val="14F597"/>
+      </a:accent4>
+      <a:accent5>
+        <a:srgbClr val="3D4594"/>
+      </a:accent5>
+      <a:accent6>
+        <a:srgbClr val="163EF5"/>
+      </a:accent6>
+      <a:hlink>
+        <a:srgbClr val="3D4594"/>
+      </a:hlink>
+      <a:folHlink>
+        <a:srgbClr val="3D4594"/>
+      </a:folHlink>
+    </a:clrScheme>
+    <a:fontScheme name="Office">
+      <a:majorFont>
+        <a:latin typeface="Arial"/>
+        <a:ea typeface=""/>
+        <a:cs typeface=""/>
+        <a:font script="Jpan" typeface="ＭＳ Ｐゴシック"/>
+        <a:font script="Hang" typeface="맑은 고딕"/>
+        <a:font script="Hans" typeface="宋体"/>
+        <a:font script="Hant" typeface="新細明體"/>
+        <a:font script="Arab" typeface="Times New Roman"/>
+        <a:font script="Hebr" typeface="Times New Roman"/>
+        <a:font script="Thai" typeface="Angsana New"/>
+        <a:font script="Ethi" typeface="Nyala"/>
+        <a:font script="Beng" typeface="Vrinda"/>
+        <a:font script="Gujr" typeface="Shruti"/>
+        <a:font script="Khmr" typeface="MoolBoran"/>
+        <a:font script="Knda" typeface="Tunga"/>
+        <a:font script="Guru" typeface="Raavi"/>
+        <a:font script="Cans" typeface="Euphemia"/>
+        <a:font script="Cher" typeface="Plantagenet Cherokee"/>
+        <a:font script="Yiii" typeface="Microsoft Yi Baiti"/>
+        <a:font script="Tibt" typeface="Microsoft Himalaya"/>
+        <a:font script="Thaa" typeface="MV Boli"/>
+        <a:font script="Deva" typeface="Mangal"/>
+        <a:font script="Telu" typeface="Gautami"/>
+        <a:font script="Taml" typeface="Latha"/>
+        <a:font script="Syrc" typeface="Estrangelo Edessa"/>
+        <a:font script="Orya" typeface="Kalinga"/>
+        <a:font script="Mlym" typeface="Kartika"/>
+        <a:font script="Laoo" typeface="DokChampa"/>
+        <a:font script="Sinh" typeface="Iskoola Pota"/>
+        <a:font script="Mong" typeface="Mongolian Baiti"/>
+        <a:font script="Viet" typeface="Times New Roman"/>
+        <a:font script="Uigh" typeface="Microsoft Uighur"/>
+        <a:font script="Geor" typeface="Sylfaen"/>
+      </a:majorFont>
+      <a:minorFont>
+        <a:latin typeface="Arial"/>
+        <a:ea typeface=""/>
+        <a:cs typeface=""/>
+        <a:font script="Jpan" typeface="ＭＳ Ｐゴシック"/>
+        <a:font script="Hang" typeface="맑은 고딕"/>
+        <a:font script="Hans" typeface="宋体"/>
+        <a:font script="Hant" typeface="新細明體"/>
+        <a:font script="Arab" typeface="Arial"/>
+        <a:font script="Hebr" typeface="Arial"/>
+        <a:font script="Thai" typeface="Cordia New"/>
+        <a:font script="Ethi" typeface="Nyala"/>
+        <a:font script="Beng" typeface="Vrinda"/>
+        <a:font script="Gujr" typeface="Shruti"/>
+        <a:font script="Khmr" typeface="DaunPenh"/>
+        <a:font script="Knda" typeface="Tunga"/>
+        <a:font script="Guru" typeface="Raavi"/>
+        <a:font script="Cans" typeface="Euphemia"/>
+        <a:font script="Cher" typeface="Plantagenet Cherokee"/>
+        <a:font script="Yiii" typeface="Microsoft Yi Baiti"/>
+        <a:font script="Tibt" typeface="Microsoft Himalaya"/>
+        <a:font script="Thaa" typeface="MV Boli"/>
+        <a:font script="Deva" typeface="Mangal"/>
+        <a:font script="Telu" typeface="Gautami"/>
+        <a:font script="Taml" typeface="Latha"/>
+        <a:font script="Syrc" typeface="Estrangelo Edessa"/>
+        <a:font script="Orya" typeface="Kalinga"/>
+        <a:font script="Mlym" typeface="Kartika"/>
+        <a:font script="Laoo" typeface="DokChampa"/>
+        <a:font script="Sinh" typeface="Iskoola Pota"/>
+        <a:font script="Mong" typeface="Mongolian Baiti"/>
+        <a:font script="Viet" typeface="Arial"/>
+        <a:font script="Uigh" typeface="Microsoft Uighur"/>
+        <a:font script="Geor" typeface="Sylfaen"/>
+      </a:minorFont>
+    </a:fontScheme>
+    <a:fmtScheme name="Office">
+      <a:fillStyleLst>
+        <a:solidFill>
+          <a:schemeClr val="phClr"/>
+        </a:solidFill>
+        <a:gradFill rotWithShape="1">
+          <a:gsLst>
+            <a:gs pos="0">
+              <a:schemeClr val="phClr">
+                <a:tint val="50000"/>
+                <a:satMod val="300000"/>
+              </a:schemeClr>
+            </a:gs>
+            <a:gs pos="35000">
+              <a:schemeClr val="phClr">
+                <a:tint val="37000"/>
+                <a:satMod val="300000"/>
+              </a:schemeClr>
+            </a:gs>
+            <a:gs pos="100000">
+              <a:schemeClr val="phClr">
+                <a:tint val="15000"/>
+                <a:satMod val="350000"/>
+              </a:schemeClr>
+            </a:gs>
+          </a:gsLst>
+          <a:lin ang="16200000" scaled="1"/>
+        </a:gradFill>
+        <a:gradFill rotWithShape="1">
+          <a:gsLst>
+            <a:gs pos="0">
+              <a:schemeClr val="phClr">
+                <a:tint val="100000"/>
+                <a:shade val="100000"/>
+                <a:satMod val="130000"/>
+              </a:schemeClr>
+            </a:gs>
+            <a:gs pos="100000">
+              <a:schemeClr val="phClr">
+                <a:tint val="50000"/>
+                <a:shade val="100000"/>
+                <a:satMod val="350000"/>
+              </a:schemeClr>
+            </a:gs>
+          </a:gsLst>
+          <a:lin ang="16200000" scaled="0"/>
+        </a:gradFill>
+      </a:fillStyleLst>
+      <a:lnStyleLst>
+        <a:ln w="9525" cap="flat" cmpd="sng" algn="ctr">
+          <a:solidFill>
+            <a:schemeClr val="phClr">
+              <a:shade val="95000"/>
+              <a:satMod val="105000"/>
+            </a:schemeClr>
+          </a:solidFill>
+          <a:prstDash val="solid"/>
+        </a:ln>
+        <a:ln w="25400" cap="flat" cmpd="sng" algn="ctr">
+          <a:solidFill>
+            <a:schemeClr val="phClr"/>
+          </a:solidFill>
+          <a:prstDash val="solid"/>
+        </a:ln>
+        <a:ln w="38100" cap="flat" cmpd="sng" algn="ctr">
+          <a:solidFill>
+            <a:schemeClr val="phClr"/>
+          </a:solidFill>
+          <a:prstDash val="solid"/>
+        </a:ln>
+      </a:lnStyleLst>
+      <a:effectStyleLst>
+        <a:effectStyle>
+          <a:effectLst>
+            <a:outerShdw blurRad="40000" dist="20000" dir="5400000" rotWithShape="0">
+              <a:srgbClr val="000000">
+                <a:alpha val="38000"/>
+              </a:srgbClr>
+            </a:outerShdw>
+          </a:effectLst>
+        </a:effectStyle>
+        <a:effectStyle>
+          <a:effectLst>
+            <a:outerShdw blurRad="40000" dist="23000" dir="5400000" rotWithShape="0">
+              <a:srgbClr val="000000">
+                <a:alpha val="35000"/>
+              </a:srgbClr>
+            </a:outerShdw>
+          </a:effectLst>
+        </a:effectStyle>
+        <a:effectStyle>
+          <a:effectLst>
+            <a:outerShdw blurRad="40000" dist="23000" dir="5400000" rotWithShape="0">
+              <a:srgbClr val="000000">
+                <a:alpha val="35000"/>
+              </a:srgbClr>
+            </a:outerShdw>
+          </a:effectLst>
+          <a:scene3d>
+            <a:camera prst="orthographicFront">
+              <a:rot lat="0" lon="0" rev="0"/>
+            </a:camera>
+            <a:lightRig rig="threePt" dir="t">
+              <a:rot lat="0" lon="0" rev="1200000"/>
+            </a:lightRig>
+          </a:scene3d>
+          <a:sp3d>
+            <a:bevelT w="63500" h="25400"/>
+          </a:sp3d>
+        </a:effectStyle>
+      </a:effectStyleLst>
+      <a:bgFillStyleLst>
+        <a:solidFill>
+          <a:schemeClr val="phClr"/>
+        </a:solidFill>
+        <a:gradFill rotWithShape="1">
+          <a:gsLst>
+            <a:gs pos="0">
+              <a:schemeClr val="phClr">
+                <a:tint val="40000"/>
+                <a:satMod val="350000"/>
+              </a:schemeClr>
+            </a:gs>
+            <a:gs pos="40000">
+              <a:schemeClr val="phClr">
+                <a:tint val="45000"/>
+                <a:shade val="99000"/>
+                <a:satMod val="350000"/>
+              </a:schemeClr>
+            </a:gs>
+            <a:gs pos="100000">
+              <a:schemeClr val="phClr">
+                <a:shade val="20000"/>
+                <a:satMod val="255000"/>
+              </a:schemeClr>
+            </a:gs>
+          </a:gsLst>
+          <a:path path="circle">
+            <a:fillToRect l="50000" t="-80000" r="50000" b="180000"/>
+          </a:path>
+        </a:gradFill>
+        <a:gradFill rotWithShape="1">
+          <a:gsLst>
+            <a:gs pos="0">
+              <a:schemeClr val="phClr">
+                <a:tint val="80000"/>
+                <a:satMod val="300000"/>
+              </a:schemeClr>
+            </a:gs>
+            <a:gs pos="100000">
+              <a:schemeClr val="phClr">
+                <a:shade val="30000"/>
+                <a:satMod val="200000"/>
+              </a:schemeClr>
+            </a:gs>
+          </a:gsLst>
+          <a:path path="circle">
+            <a:fillToRect l="50000" t="50000" r="50000" b="50000"/>
+          </a:path>
+        </a:gradFill>
+      </a:bgFillStyleLst>
+    </a:fmtScheme>
+  </a:themeElements>
+</a:theme>
+</file>
+
+<file path=ppt/theme/theme2.xml><?xml version="1.0" encoding="utf-8"?>
 <a:theme xmlns:a="http://schemas.openxmlformats.org/drawingml/2006/main" xmlns:r="http://schemas.openxmlformats.org/officeDocument/2006/relationships">
   <a:themeElements>
     <a:clrScheme name="Default">
@@ -15567,283 +16012,4 @@
     </a:fmtScheme>
   </a:themeElements>
 </a:theme>
-</file>
-
-<file path=ppt/theme/theme2.xml><?xml version="1.0" encoding="utf-8"?>
-<a:theme xmlns:a="http://schemas.openxmlformats.org/drawingml/2006/main" xmlns:r="http://schemas.openxmlformats.org/officeDocument/2006/relationships" name="Shift">
-  <a:themeElements>
-    <a:clrScheme name="Shift">
-      <a:dk1>
-        <a:srgbClr val="FFFFFF"/>
-      </a:dk1>
-      <a:lt1>
-        <a:srgbClr val="AF7B51"/>
-      </a:lt1>
-      <a:dk2>
-        <a:srgbClr val="233A44"/>
-      </a:dk2>
-      <a:lt2>
-        <a:srgbClr val="D9D9D9"/>
-      </a:lt2>
-      <a:accent1>
-        <a:srgbClr val="00796B"/>
-      </a:accent1>
-      <a:accent2>
-        <a:srgbClr val="D9563F"/>
-      </a:accent2>
-      <a:accent3>
-        <a:srgbClr val="C4A15A"/>
-      </a:accent3>
-      <a:accent4>
-        <a:srgbClr val="14F597"/>
-      </a:accent4>
-      <a:accent5>
-        <a:srgbClr val="3D4594"/>
-      </a:accent5>
-      <a:accent6>
-        <a:srgbClr val="163EF5"/>
-      </a:accent6>
-      <a:hlink>
-        <a:srgbClr val="3D4594"/>
-      </a:hlink>
-      <a:folHlink>
-        <a:srgbClr val="3D4594"/>
-      </a:folHlink>
-    </a:clrScheme>
-    <a:fontScheme name="Office">
-      <a:majorFont>
-        <a:latin typeface="Arial"/>
-        <a:ea typeface=""/>
-        <a:cs typeface=""/>
-        <a:font script="Jpan" typeface="ＭＳ Ｐゴシック"/>
-        <a:font script="Hang" typeface="맑은 고딕"/>
-        <a:font script="Hans" typeface="宋体"/>
-        <a:font script="Hant" typeface="新細明體"/>
-        <a:font script="Arab" typeface="Times New Roman"/>
-        <a:font script="Hebr" typeface="Times New Roman"/>
-        <a:font script="Thai" typeface="Angsana New"/>
-        <a:font script="Ethi" typeface="Nyala"/>
-        <a:font script="Beng" typeface="Vrinda"/>
-        <a:font script="Gujr" typeface="Shruti"/>
-        <a:font script="Khmr" typeface="MoolBoran"/>
-        <a:font script="Knda" typeface="Tunga"/>
-        <a:font script="Guru" typeface="Raavi"/>
-        <a:font script="Cans" typeface="Euphemia"/>
-        <a:font script="Cher" typeface="Plantagenet Cherokee"/>
-        <a:font script="Yiii" typeface="Microsoft Yi Baiti"/>
-        <a:font script="Tibt" typeface="Microsoft Himalaya"/>
-        <a:font script="Thaa" typeface="MV Boli"/>
-        <a:font script="Deva" typeface="Mangal"/>
-        <a:font script="Telu" typeface="Gautami"/>
-        <a:font script="Taml" typeface="Latha"/>
-        <a:font script="Syrc" typeface="Estrangelo Edessa"/>
-        <a:font script="Orya" typeface="Kalinga"/>
-        <a:font script="Mlym" typeface="Kartika"/>
-        <a:font script="Laoo" typeface="DokChampa"/>
-        <a:font script="Sinh" typeface="Iskoola Pota"/>
-        <a:font script="Mong" typeface="Mongolian Baiti"/>
-        <a:font script="Viet" typeface="Times New Roman"/>
-        <a:font script="Uigh" typeface="Microsoft Uighur"/>
-        <a:font script="Geor" typeface="Sylfaen"/>
-      </a:majorFont>
-      <a:minorFont>
-        <a:latin typeface="Arial"/>
-        <a:ea typeface=""/>
-        <a:cs typeface=""/>
-        <a:font script="Jpan" typeface="ＭＳ Ｐゴシック"/>
-        <a:font script="Hang" typeface="맑은 고딕"/>
-        <a:font script="Hans" typeface="宋体"/>
-        <a:font script="Hant" typeface="新細明體"/>
-        <a:font script="Arab" typeface="Arial"/>
-        <a:font script="Hebr" typeface="Arial"/>
-        <a:font script="Thai" typeface="Cordia New"/>
-        <a:font script="Ethi" typeface="Nyala"/>
-        <a:font script="Beng" typeface="Vrinda"/>
-        <a:font script="Gujr" typeface="Shruti"/>
-        <a:font script="Khmr" typeface="DaunPenh"/>
-        <a:font script="Knda" typeface="Tunga"/>
-        <a:font script="Guru" typeface="Raavi"/>
-        <a:font script="Cans" typeface="Euphemia"/>
-        <a:font script="Cher" typeface="Plantagenet Cherokee"/>
-        <a:font script="Yiii" typeface="Microsoft Yi Baiti"/>
-        <a:font script="Tibt" typeface="Microsoft Himalaya"/>
-        <a:font script="Thaa" typeface="MV Boli"/>
-        <a:font script="Deva" typeface="Mangal"/>
-        <a:font script="Telu" typeface="Gautami"/>
-        <a:font script="Taml" typeface="Latha"/>
-        <a:font script="Syrc" typeface="Estrangelo Edessa"/>
-        <a:font script="Orya" typeface="Kalinga"/>
-        <a:font script="Mlym" typeface="Kartika"/>
-        <a:font script="Laoo" typeface="DokChampa"/>
-        <a:font script="Sinh" typeface="Iskoola Pota"/>
-        <a:font script="Mong" typeface="Mongolian Baiti"/>
-        <a:font script="Viet" typeface="Arial"/>
-        <a:font script="Uigh" typeface="Microsoft Uighur"/>
-        <a:font script="Geor" typeface="Sylfaen"/>
-      </a:minorFont>
-    </a:fontScheme>
-    <a:fmtScheme name="Office">
-      <a:fillStyleLst>
-        <a:solidFill>
-          <a:schemeClr val="phClr"/>
-        </a:solidFill>
-        <a:gradFill rotWithShape="1">
-          <a:gsLst>
-            <a:gs pos="0">
-              <a:schemeClr val="phClr">
-                <a:tint val="50000"/>
-                <a:satMod val="300000"/>
-              </a:schemeClr>
-            </a:gs>
-            <a:gs pos="35000">
-              <a:schemeClr val="phClr">
-                <a:tint val="37000"/>
-                <a:satMod val="300000"/>
-              </a:schemeClr>
-            </a:gs>
-            <a:gs pos="100000">
-              <a:schemeClr val="phClr">
-                <a:tint val="15000"/>
-                <a:satMod val="350000"/>
-              </a:schemeClr>
-            </a:gs>
-          </a:gsLst>
-          <a:lin ang="16200000" scaled="1"/>
-        </a:gradFill>
-        <a:gradFill rotWithShape="1">
-          <a:gsLst>
-            <a:gs pos="0">
-              <a:schemeClr val="phClr">
-                <a:tint val="100000"/>
-                <a:shade val="100000"/>
-                <a:satMod val="130000"/>
-              </a:schemeClr>
-            </a:gs>
-            <a:gs pos="100000">
-              <a:schemeClr val="phClr">
-                <a:tint val="50000"/>
-                <a:shade val="100000"/>
-                <a:satMod val="350000"/>
-              </a:schemeClr>
-            </a:gs>
-          </a:gsLst>
-          <a:lin ang="16200000" scaled="0"/>
-        </a:gradFill>
-      </a:fillStyleLst>
-      <a:lnStyleLst>
-        <a:ln w="9525" cap="flat" cmpd="sng" algn="ctr">
-          <a:solidFill>
-            <a:schemeClr val="phClr">
-              <a:shade val="95000"/>
-              <a:satMod val="105000"/>
-            </a:schemeClr>
-          </a:solidFill>
-          <a:prstDash val="solid"/>
-        </a:ln>
-        <a:ln w="25400" cap="flat" cmpd="sng" algn="ctr">
-          <a:solidFill>
-            <a:schemeClr val="phClr"/>
-          </a:solidFill>
-          <a:prstDash val="solid"/>
-        </a:ln>
-        <a:ln w="38100" cap="flat" cmpd="sng" algn="ctr">
-          <a:solidFill>
-            <a:schemeClr val="phClr"/>
-          </a:solidFill>
-          <a:prstDash val="solid"/>
-        </a:ln>
-      </a:lnStyleLst>
-      <a:effectStyleLst>
-        <a:effectStyle>
-          <a:effectLst>
-            <a:outerShdw blurRad="40000" dist="20000" dir="5400000" rotWithShape="0">
-              <a:srgbClr val="000000">
-                <a:alpha val="38000"/>
-              </a:srgbClr>
-            </a:outerShdw>
-          </a:effectLst>
-        </a:effectStyle>
-        <a:effectStyle>
-          <a:effectLst>
-            <a:outerShdw blurRad="40000" dist="23000" dir="5400000" rotWithShape="0">
-              <a:srgbClr val="000000">
-                <a:alpha val="35000"/>
-              </a:srgbClr>
-            </a:outerShdw>
-          </a:effectLst>
-        </a:effectStyle>
-        <a:effectStyle>
-          <a:effectLst>
-            <a:outerShdw blurRad="40000" dist="23000" dir="5400000" rotWithShape="0">
-              <a:srgbClr val="000000">
-                <a:alpha val="35000"/>
-              </a:srgbClr>
-            </a:outerShdw>
-          </a:effectLst>
-          <a:scene3d>
-            <a:camera prst="orthographicFront">
-              <a:rot lat="0" lon="0" rev="0"/>
-            </a:camera>
-            <a:lightRig rig="threePt" dir="t">
-              <a:rot lat="0" lon="0" rev="1200000"/>
-            </a:lightRig>
-          </a:scene3d>
-          <a:sp3d>
-            <a:bevelT w="63500" h="25400"/>
-          </a:sp3d>
-        </a:effectStyle>
-      </a:effectStyleLst>
-      <a:bgFillStyleLst>
-        <a:solidFill>
-          <a:schemeClr val="phClr"/>
-        </a:solidFill>
-        <a:gradFill rotWithShape="1">
-          <a:gsLst>
-            <a:gs pos="0">
-              <a:schemeClr val="phClr">
-                <a:tint val="40000"/>
-                <a:satMod val="350000"/>
-              </a:schemeClr>
-            </a:gs>
-            <a:gs pos="40000">
-              <a:schemeClr val="phClr">
-                <a:tint val="45000"/>
-                <a:shade val="99000"/>
-                <a:satMod val="350000"/>
-              </a:schemeClr>
-            </a:gs>
-            <a:gs pos="100000">
-              <a:schemeClr val="phClr">
-                <a:shade val="20000"/>
-                <a:satMod val="255000"/>
-              </a:schemeClr>
-            </a:gs>
-          </a:gsLst>
-          <a:path path="circle">
-            <a:fillToRect l="50000" t="-80000" r="50000" b="180000"/>
-          </a:path>
-        </a:gradFill>
-        <a:gradFill rotWithShape="1">
-          <a:gsLst>
-            <a:gs pos="0">
-              <a:schemeClr val="phClr">
-                <a:tint val="80000"/>
-                <a:satMod val="300000"/>
-              </a:schemeClr>
-            </a:gs>
-            <a:gs pos="100000">
-              <a:schemeClr val="phClr">
-                <a:shade val="30000"/>
-                <a:satMod val="200000"/>
-              </a:schemeClr>
-            </a:gs>
-          </a:gsLst>
-          <a:path path="circle">
-            <a:fillToRect l="50000" t="50000" r="50000" b="50000"/>
-          </a:path>
-        </a:gradFill>
-      </a:bgFillStyleLst>
-    </a:fmtScheme>
-  </a:themeElements>
-</a:theme>
 </file>
</xml_diff>